<commit_message>
training on full dataet
</commit_message>
<xml_diff>
--- a/sarcasm detection final.pptx
+++ b/sarcasm detection final.pptx
@@ -909,7 +909,7 @@
             <a:fld id="{404B60A4-1E53-4BFC-9000-2C4DE3455AFE}" type="datetime1">
               <a:rPr lang="en-US"/>
               <a:pPr lvl="0"/>
-              <a:t>2/13/2025</a:t>
+              <a:t>2/14/2025</a:t>
             </a:fld>
             <a:endParaRPr lang="en-US"/>
           </a:p>
@@ -1175,7 +1175,7 @@
             <a:fld id="{3F36B858-CF0D-489E-A3A2-93FCBBEDCF58}" type="datetime1">
               <a:rPr lang="en-US"/>
               <a:pPr lvl="0"/>
-              <a:t>2/13/2025</a:t>
+              <a:t>2/14/2025</a:t>
             </a:fld>
             <a:endParaRPr lang="en-US"/>
           </a:p>
@@ -1493,7 +1493,7 @@
             <a:fld id="{F0F10D96-3F7B-4E44-BFA5-036B9516072A}" type="datetime1">
               <a:rPr lang="en-US"/>
               <a:pPr lvl="0"/>
-              <a:t>2/13/2025</a:t>
+              <a:t>2/14/2025</a:t>
             </a:fld>
             <a:endParaRPr lang="en-US"/>
           </a:p>
@@ -1729,7 +1729,7 @@
             <a:fld id="{824CC494-8248-4C8D-A99C-E2F66B99867D}" type="datetime1">
               <a:rPr lang="en-US"/>
               <a:pPr lvl="0"/>
-              <a:t>2/13/2025</a:t>
+              <a:t>2/14/2025</a:t>
             </a:fld>
             <a:endParaRPr lang="en-US"/>
           </a:p>
@@ -2025,7 +2025,7 @@
             <a:fld id="{EA375B16-E619-4ABF-A9DF-FFBF0E99F673}" type="datetime1">
               <a:rPr lang="en-US"/>
               <a:pPr lvl="0"/>
-              <a:t>2/13/2025</a:t>
+              <a:t>2/14/2025</a:t>
             </a:fld>
             <a:endParaRPr lang="en-US"/>
           </a:p>
@@ -2374,7 +2374,7 @@
             <a:fld id="{7152377E-E96B-42BC-A6B0-451C2FBEADDA}" type="datetime1">
               <a:rPr lang="en-US"/>
               <a:pPr lvl="0"/>
-              <a:t>2/13/2025</a:t>
+              <a:t>2/14/2025</a:t>
             </a:fld>
             <a:endParaRPr lang="en-US"/>
           </a:p>
@@ -2780,7 +2780,7 @@
             <a:fld id="{4A4ED354-61E6-41B0-849E-E3FD47D9895A}" type="datetime1">
               <a:rPr lang="en-US"/>
               <a:pPr lvl="0"/>
-              <a:t>2/13/2025</a:t>
+              <a:t>2/14/2025</a:t>
             </a:fld>
             <a:endParaRPr lang="en-US"/>
           </a:p>
@@ -2942,7 +2942,7 @@
             <a:fld id="{BF936327-1A4A-4B2D-8307-5143A5C351BC}" type="datetime1">
               <a:rPr lang="en-US"/>
               <a:pPr lvl="0"/>
-              <a:t>2/13/2025</a:t>
+              <a:t>2/14/2025</a:t>
             </a:fld>
             <a:endParaRPr lang="en-US"/>
           </a:p>
@@ -3142,7 +3142,7 @@
             <a:fld id="{90D26C3D-5DBC-4EAB-BC3A-0777B6C4BB1B}" type="datetime1">
               <a:rPr lang="en-US"/>
               <a:pPr lvl="0"/>
-              <a:t>2/13/2025</a:t>
+              <a:t>2/14/2025</a:t>
             </a:fld>
             <a:endParaRPr lang="en-US"/>
           </a:p>
@@ -3512,7 +3512,7 @@
             <a:fld id="{931484D2-5883-4E8D-B3D8-4936CC3D71F7}" type="datetime1">
               <a:rPr lang="en-US"/>
               <a:pPr lvl="0"/>
-              <a:t>2/13/2025</a:t>
+              <a:t>2/14/2025</a:t>
             </a:fld>
             <a:endParaRPr lang="en-US"/>
           </a:p>
@@ -3869,7 +3869,7 @@
             <a:fld id="{519B729D-AB5D-4665-85C0-5BE89FFD8F9C}" type="datetime1">
               <a:rPr lang="en-US"/>
               <a:pPr lvl="0"/>
-              <a:t>2/13/2025</a:t>
+              <a:t>2/14/2025</a:t>
             </a:fld>
             <a:endParaRPr lang="en-US"/>
           </a:p>
@@ -4224,7 +4224,7 @@
             <a:fld id="{60994DB2-2D28-405C-B298-1A95FDE3B8D2}" type="datetime1">
               <a:rPr lang="en-US"/>
               <a:pPr lvl="0"/>
-              <a:t>2/13/2025</a:t>
+              <a:t>2/14/2025</a:t>
             </a:fld>
             <a:endParaRPr lang="en-US"/>
           </a:p>
@@ -7368,21 +7368,11 @@
             </a:pPr>
             <a:r>
               <a:rPr lang="en-US" sz="2200" dirty="0"/>
-              <a:t>   F1 Score</a:t>
-            </a:r>
-          </a:p>
-          <a:p>
-            <a:pPr lvl="0">
-              <a:buFont typeface="Wingdings" pitchFamily="2"/>
-              <a:buChar char="l"/>
-            </a:pPr>
+              <a:t>   </a:t>
+            </a:r>
             <a:r>
               <a:rPr lang="en-US" sz="2200"/>
-              <a:t>   Log </a:t>
-            </a:r>
-            <a:r>
-              <a:rPr lang="en-US" altLang="zh-CN" sz="2200"/>
-              <a:t>loss</a:t>
+              <a:t>F1 Score</a:t>
             </a:r>
             <a:endParaRPr lang="en-US" sz="2200" dirty="0"/>
           </a:p>

</xml_diff>